<commit_message>
updated equipment setup page
</commit_message>
<xml_diff>
--- a/docs/EquipmentSetup/Equipment.pptx
+++ b/docs/EquipmentSetup/Equipment.pptx
@@ -5,14 +5,15 @@
     <p:sldMasterId id="2147483660" r:id="rId1"/>
   </p:sldMasterIdLst>
   <p:notesMasterIdLst>
-    <p:notesMasterId r:id="rId7"/>
+    <p:notesMasterId r:id="rId8"/>
   </p:notesMasterIdLst>
   <p:sldIdLst>
     <p:sldId id="260" r:id="rId2"/>
-    <p:sldId id="261" r:id="rId3"/>
-    <p:sldId id="257" r:id="rId4"/>
-    <p:sldId id="258" r:id="rId5"/>
-    <p:sldId id="259" r:id="rId6"/>
+    <p:sldId id="262" r:id="rId3"/>
+    <p:sldId id="261" r:id="rId4"/>
+    <p:sldId id="257" r:id="rId5"/>
+    <p:sldId id="258" r:id="rId6"/>
+    <p:sldId id="259" r:id="rId7"/>
   </p:sldIdLst>
   <p:sldSz cx="6858000" cy="9144000" type="letter"/>
   <p:notesSz cx="6858000" cy="9144000"/>
@@ -1936,7 +1937,7 @@
           <a:p>
             <a:fld id="{B9503A7B-FFA9-4535-9439-F7DED7245B92}" type="datetimeFigureOut">
               <a:rPr lang="en-CA" smtClean="0"/>
-              <a:t>2022-12-30</a:t>
+              <a:t>2023-01-03</a:t>
             </a:fld>
             <a:endParaRPr lang="en-CA"/>
           </a:p>
@@ -2335,7 +2336,7 @@
           <a:p>
             <a:fld id="{DFF2FBC3-E573-4B2D-B1C4-960EEBA08826}" type="datetimeFigureOut">
               <a:rPr lang="fr-CA" smtClean="0"/>
-              <a:t>2022-12-30</a:t>
+              <a:t>2023-01-03</a:t>
             </a:fld>
             <a:endParaRPr lang="fr-CA"/>
           </a:p>
@@ -2505,7 +2506,7 @@
           <a:p>
             <a:fld id="{DFF2FBC3-E573-4B2D-B1C4-960EEBA08826}" type="datetimeFigureOut">
               <a:rPr lang="fr-CA" smtClean="0"/>
-              <a:t>2022-12-30</a:t>
+              <a:t>2023-01-03</a:t>
             </a:fld>
             <a:endParaRPr lang="fr-CA"/>
           </a:p>
@@ -2685,7 +2686,7 @@
           <a:p>
             <a:fld id="{DFF2FBC3-E573-4B2D-B1C4-960EEBA08826}" type="datetimeFigureOut">
               <a:rPr lang="fr-CA" smtClean="0"/>
-              <a:t>2022-12-30</a:t>
+              <a:t>2023-01-03</a:t>
             </a:fld>
             <a:endParaRPr lang="fr-CA"/>
           </a:p>
@@ -2855,7 +2856,7 @@
           <a:p>
             <a:fld id="{DFF2FBC3-E573-4B2D-B1C4-960EEBA08826}" type="datetimeFigureOut">
               <a:rPr lang="fr-CA" smtClean="0"/>
-              <a:t>2022-12-30</a:t>
+              <a:t>2023-01-03</a:t>
             </a:fld>
             <a:endParaRPr lang="fr-CA"/>
           </a:p>
@@ -3099,7 +3100,7 @@
           <a:p>
             <a:fld id="{DFF2FBC3-E573-4B2D-B1C4-960EEBA08826}" type="datetimeFigureOut">
               <a:rPr lang="fr-CA" smtClean="0"/>
-              <a:t>2022-12-30</a:t>
+              <a:t>2023-01-03</a:t>
             </a:fld>
             <a:endParaRPr lang="fr-CA"/>
           </a:p>
@@ -3331,7 +3332,7 @@
           <a:p>
             <a:fld id="{DFF2FBC3-E573-4B2D-B1C4-960EEBA08826}" type="datetimeFigureOut">
               <a:rPr lang="fr-CA" smtClean="0"/>
-              <a:t>2022-12-30</a:t>
+              <a:t>2023-01-03</a:t>
             </a:fld>
             <a:endParaRPr lang="fr-CA"/>
           </a:p>
@@ -3698,7 +3699,7 @@
           <a:p>
             <a:fld id="{DFF2FBC3-E573-4B2D-B1C4-960EEBA08826}" type="datetimeFigureOut">
               <a:rPr lang="fr-CA" smtClean="0"/>
-              <a:t>2022-12-30</a:t>
+              <a:t>2023-01-03</a:t>
             </a:fld>
             <a:endParaRPr lang="fr-CA"/>
           </a:p>
@@ -3816,7 +3817,7 @@
           <a:p>
             <a:fld id="{DFF2FBC3-E573-4B2D-B1C4-960EEBA08826}" type="datetimeFigureOut">
               <a:rPr lang="fr-CA" smtClean="0"/>
-              <a:t>2022-12-30</a:t>
+              <a:t>2023-01-03</a:t>
             </a:fld>
             <a:endParaRPr lang="fr-CA"/>
           </a:p>
@@ -3911,7 +3912,7 @@
           <a:p>
             <a:fld id="{DFF2FBC3-E573-4B2D-B1C4-960EEBA08826}" type="datetimeFigureOut">
               <a:rPr lang="fr-CA" smtClean="0"/>
-              <a:t>2022-12-30</a:t>
+              <a:t>2023-01-03</a:t>
             </a:fld>
             <a:endParaRPr lang="fr-CA"/>
           </a:p>
@@ -4188,7 +4189,7 @@
           <a:p>
             <a:fld id="{DFF2FBC3-E573-4B2D-B1C4-960EEBA08826}" type="datetimeFigureOut">
               <a:rPr lang="fr-CA" smtClean="0"/>
-              <a:t>2022-12-30</a:t>
+              <a:t>2023-01-03</a:t>
             </a:fld>
             <a:endParaRPr lang="fr-CA"/>
           </a:p>
@@ -4445,7 +4446,7 @@
           <a:p>
             <a:fld id="{DFF2FBC3-E573-4B2D-B1C4-960EEBA08826}" type="datetimeFigureOut">
               <a:rPr lang="fr-CA" smtClean="0"/>
-              <a:t>2022-12-30</a:t>
+              <a:t>2023-01-03</a:t>
             </a:fld>
             <a:endParaRPr lang="fr-CA"/>
           </a:p>
@@ -4658,7 +4659,7 @@
           <a:p>
             <a:fld id="{DFF2FBC3-E573-4B2D-B1C4-960EEBA08826}" type="datetimeFigureOut">
               <a:rPr lang="fr-CA" smtClean="0"/>
-              <a:t>2022-12-30</a:t>
+              <a:t>2023-01-03</a:t>
             </a:fld>
             <a:endParaRPr lang="fr-CA"/>
           </a:p>
@@ -5077,6 +5078,1047 @@
         </p:nvSpPr>
         <p:spPr>
           <a:xfrm>
+            <a:off x="3582792" y="2879178"/>
+            <a:ext cx="587020" cy="248209"/>
+          </a:xfrm>
+          <a:prstGeom prst="rect">
+            <a:avLst/>
+          </a:prstGeom>
+          <a:noFill/>
+        </p:spPr>
+        <p:txBody>
+          <a:bodyPr wrap="none" rtlCol="0">
+            <a:spAutoFit/>
+          </a:bodyPr>
+          <a:lstStyle/>
+          <a:p>
+            <a:pPr algn="ctr"/>
+            <a:r>
+              <a:rPr lang="fr-CA" sz="1013" dirty="0">
+                <a:solidFill>
+                  <a:schemeClr val="accent1"/>
+                </a:solidFill>
+              </a:rPr>
+              <a:t>owlcms</a:t>
+            </a:r>
+          </a:p>
+        </p:txBody>
+      </p:sp>
+      <p:pic>
+        <p:nvPicPr>
+          <p:cNvPr id="78" name="Graphic 77" descr="Laptop">
+            <a:extLst>
+              <a:ext uri="{FF2B5EF4-FFF2-40B4-BE49-F238E27FC236}">
+                <a16:creationId xmlns:a16="http://schemas.microsoft.com/office/drawing/2014/main" id="{4BF89AD2-596B-7C94-1344-0D34039A4EE0}"/>
+              </a:ext>
+            </a:extLst>
+          </p:cNvPr>
+          <p:cNvPicPr>
+            <a:picLocks noChangeAspect="1"/>
+          </p:cNvPicPr>
+          <p:nvPr/>
+        </p:nvPicPr>
+        <p:blipFill>
+          <a:blip r:embed="rId2">
+            <a:extLst>
+              <a:ext uri="{28A0092B-C50C-407E-A947-70E740481C1C}">
+                <a14:useLocalDpi xmlns:a14="http://schemas.microsoft.com/office/drawing/2010/main" val="0"/>
+              </a:ext>
+              <a:ext uri="{96DAC541-7B7A-43D3-8B79-37D633B846F1}">
+                <asvg:svgBlip xmlns:asvg="http://schemas.microsoft.com/office/drawing/2016/SVG/main" r:embed="rId3"/>
+              </a:ext>
+            </a:extLst>
+          </a:blip>
+          <a:stretch>
+            <a:fillRect/>
+          </a:stretch>
+        </p:blipFill>
+        <p:spPr>
+          <a:xfrm>
+            <a:off x="3606828" y="2543115"/>
+            <a:ext cx="514350" cy="514350"/>
+          </a:xfrm>
+          <a:prstGeom prst="rect">
+            <a:avLst/>
+          </a:prstGeom>
+        </p:spPr>
+      </p:pic>
+      <p:grpSp>
+        <p:nvGrpSpPr>
+          <p:cNvPr id="60" name="Group 59">
+            <a:extLst>
+              <a:ext uri="{FF2B5EF4-FFF2-40B4-BE49-F238E27FC236}">
+                <a16:creationId xmlns:a16="http://schemas.microsoft.com/office/drawing/2014/main" id="{74AFF561-DD6F-5BB8-4DC0-216725C3D8B7}"/>
+              </a:ext>
+            </a:extLst>
+          </p:cNvPr>
+          <p:cNvGrpSpPr/>
+          <p:nvPr/>
+        </p:nvGrpSpPr>
+        <p:grpSpPr>
+          <a:xfrm>
+            <a:off x="3655245" y="1695889"/>
+            <a:ext cx="437452" cy="728430"/>
+            <a:chOff x="2313501" y="958704"/>
+            <a:chExt cx="437452" cy="728430"/>
+          </a:xfrm>
+        </p:grpSpPr>
+        <p:pic>
+          <p:nvPicPr>
+            <p:cNvPr id="68" name="Graphic 67" descr="Laptop">
+              <a:extLst>
+                <a:ext uri="{FF2B5EF4-FFF2-40B4-BE49-F238E27FC236}">
+                  <a16:creationId xmlns:a16="http://schemas.microsoft.com/office/drawing/2014/main" id="{0856CCFE-A969-C49A-E832-1C0E6BA50241}"/>
+                </a:ext>
+              </a:extLst>
+            </p:cNvPr>
+            <p:cNvPicPr>
+              <a:picLocks noChangeAspect="1"/>
+            </p:cNvPicPr>
+            <p:nvPr/>
+          </p:nvPicPr>
+          <p:blipFill>
+            <a:blip r:embed="rId4">
+              <a:extLst>
+                <a:ext uri="{28A0092B-C50C-407E-A947-70E740481C1C}">
+                  <a14:useLocalDpi xmlns:a14="http://schemas.microsoft.com/office/drawing/2010/main" val="0"/>
+                </a:ext>
+                <a:ext uri="{96DAC541-7B7A-43D3-8B79-37D633B846F1}">
+                  <asvg:svgBlip xmlns:asvg="http://schemas.microsoft.com/office/drawing/2016/SVG/main" r:embed="rId5"/>
+                </a:ext>
+              </a:extLst>
+            </a:blip>
+            <a:stretch>
+              <a:fillRect/>
+            </a:stretch>
+          </p:blipFill>
+          <p:spPr>
+            <a:xfrm>
+              <a:off x="2313501" y="958704"/>
+              <a:ext cx="437452" cy="456245"/>
+            </a:xfrm>
+            <a:prstGeom prst="rect">
+              <a:avLst/>
+            </a:prstGeom>
+          </p:spPr>
+        </p:pic>
+        <p:sp>
+          <p:nvSpPr>
+            <p:cNvPr id="73" name="TextBox 72">
+              <a:extLst>
+                <a:ext uri="{FF2B5EF4-FFF2-40B4-BE49-F238E27FC236}">
+                  <a16:creationId xmlns:a16="http://schemas.microsoft.com/office/drawing/2014/main" id="{0925C640-24D2-31D1-53A7-2FF27E10A476}"/>
+                </a:ext>
+              </a:extLst>
+            </p:cNvPr>
+            <p:cNvSpPr txBox="1"/>
+            <p:nvPr/>
+          </p:nvSpPr>
+          <p:spPr>
+            <a:xfrm>
+              <a:off x="2439868" y="1283049"/>
+              <a:ext cx="184730" cy="404085"/>
+            </a:xfrm>
+            <a:prstGeom prst="rect">
+              <a:avLst/>
+            </a:prstGeom>
+            <a:noFill/>
+          </p:spPr>
+          <p:txBody>
+            <a:bodyPr wrap="none" rtlCol="0">
+              <a:spAutoFit/>
+            </a:bodyPr>
+            <a:lstStyle/>
+            <a:p>
+              <a:pPr algn="ctr"/>
+              <a:br>
+                <a:rPr lang="fr-CA" sz="1013" dirty="0"/>
+              </a:br>
+              <a:endParaRPr lang="fr-CA" sz="1013" dirty="0"/>
+            </a:p>
+          </p:txBody>
+        </p:sp>
+      </p:grpSp>
+      <p:pic>
+        <p:nvPicPr>
+          <p:cNvPr id="107" name="Graphic 106" descr="Monitor with solid fill">
+            <a:extLst>
+              <a:ext uri="{FF2B5EF4-FFF2-40B4-BE49-F238E27FC236}">
+                <a16:creationId xmlns:a16="http://schemas.microsoft.com/office/drawing/2014/main" id="{F2E2F63C-280E-F8B1-E28C-3D71849220AE}"/>
+              </a:ext>
+            </a:extLst>
+          </p:cNvPr>
+          <p:cNvPicPr>
+            <a:picLocks noChangeAspect="1"/>
+          </p:cNvPicPr>
+          <p:nvPr/>
+        </p:nvPicPr>
+        <p:blipFill>
+          <a:blip r:embed="rId6">
+            <a:extLst>
+              <a:ext uri="{28A0092B-C50C-407E-A947-70E740481C1C}">
+                <a14:useLocalDpi xmlns:a14="http://schemas.microsoft.com/office/drawing/2010/main" val="0"/>
+              </a:ext>
+              <a:ext uri="{96DAC541-7B7A-43D3-8B79-37D633B846F1}">
+                <asvg:svgBlip xmlns:asvg="http://schemas.microsoft.com/office/drawing/2016/SVG/main" r:embed="rId7"/>
+              </a:ext>
+            </a:extLst>
+          </a:blip>
+          <a:stretch>
+            <a:fillRect/>
+          </a:stretch>
+        </p:blipFill>
+        <p:spPr>
+          <a:xfrm>
+            <a:off x="2725945" y="1695889"/>
+            <a:ext cx="463422" cy="463422"/>
+          </a:xfrm>
+          <a:prstGeom prst="rect">
+            <a:avLst/>
+          </a:prstGeom>
+        </p:spPr>
+      </p:pic>
+      <p:sp>
+        <p:nvSpPr>
+          <p:cNvPr id="116" name="TextBox 115">
+            <a:extLst>
+              <a:ext uri="{FF2B5EF4-FFF2-40B4-BE49-F238E27FC236}">
+                <a16:creationId xmlns:a16="http://schemas.microsoft.com/office/drawing/2014/main" id="{BE3673FE-B82F-67A8-446D-0436EA62049E}"/>
+              </a:ext>
+            </a:extLst>
+          </p:cNvPr>
+          <p:cNvSpPr txBox="1"/>
+          <p:nvPr/>
+        </p:nvSpPr>
+        <p:spPr>
+          <a:xfrm>
+            <a:off x="2492896" y="2060104"/>
+            <a:ext cx="939371" cy="317651"/>
+          </a:xfrm>
+          <a:prstGeom prst="rect">
+            <a:avLst/>
+          </a:prstGeom>
+          <a:noFill/>
+        </p:spPr>
+        <p:txBody>
+          <a:bodyPr wrap="square" rtlCol="0">
+            <a:spAutoFit/>
+          </a:bodyPr>
+          <a:lstStyle/>
+          <a:p>
+            <a:pPr algn="ctr">
+              <a:lnSpc>
+                <a:spcPct val="70000"/>
+              </a:lnSpc>
+            </a:pPr>
+            <a:r>
+              <a:rPr lang="fr-CA" sz="1013" dirty="0" err="1"/>
+              <a:t>Warmup</a:t>
+            </a:r>
+            <a:br>
+              <a:rPr lang="fr-CA" sz="1013" dirty="0"/>
+            </a:br>
+            <a:r>
+              <a:rPr lang="fr-CA" sz="1013" dirty="0"/>
+              <a:t>Scoreboard</a:t>
+            </a:r>
+          </a:p>
+        </p:txBody>
+      </p:sp>
+      <p:cxnSp>
+        <p:nvCxnSpPr>
+          <p:cNvPr id="156" name="Straight Arrow Connector 155">
+            <a:extLst>
+              <a:ext uri="{FF2B5EF4-FFF2-40B4-BE49-F238E27FC236}">
+                <a16:creationId xmlns:a16="http://schemas.microsoft.com/office/drawing/2014/main" id="{4DA848C7-A301-8B2E-29CB-1AF6F55C4FE1}"/>
+              </a:ext>
+            </a:extLst>
+          </p:cNvPr>
+          <p:cNvCxnSpPr>
+            <a:stCxn id="68" idx="1"/>
+            <a:endCxn id="107" idx="3"/>
+          </p:cNvCxnSpPr>
+          <p:nvPr/>
+        </p:nvCxnSpPr>
+        <p:spPr>
+          <a:xfrm flipH="1">
+            <a:off x="3189367" y="1924012"/>
+            <a:ext cx="465878" cy="3588"/>
+          </a:xfrm>
+          <a:prstGeom prst="straightConnector1">
+            <a:avLst/>
+          </a:prstGeom>
+          <a:ln w="25400">
+            <a:solidFill>
+              <a:schemeClr val="accent6">
+                <a:lumMod val="75000"/>
+              </a:schemeClr>
+            </a:solidFill>
+            <a:tailEnd type="triangle"/>
+          </a:ln>
+        </p:spPr>
+        <p:style>
+          <a:lnRef idx="1">
+            <a:schemeClr val="accent1"/>
+          </a:lnRef>
+          <a:fillRef idx="0">
+            <a:schemeClr val="accent1"/>
+          </a:fillRef>
+          <a:effectRef idx="0">
+            <a:schemeClr val="accent1"/>
+          </a:effectRef>
+          <a:fontRef idx="minor">
+            <a:schemeClr val="tx1"/>
+          </a:fontRef>
+        </p:style>
+      </p:cxnSp>
+      <p:pic>
+        <p:nvPicPr>
+          <p:cNvPr id="269" name="Graphic 268">
+            <a:extLst>
+              <a:ext uri="{FF2B5EF4-FFF2-40B4-BE49-F238E27FC236}">
+                <a16:creationId xmlns:a16="http://schemas.microsoft.com/office/drawing/2014/main" id="{1E362577-7114-0110-5DE8-8E20B2BB9FFE}"/>
+              </a:ext>
+            </a:extLst>
+          </p:cNvPr>
+          <p:cNvPicPr>
+            <a:picLocks noChangeAspect="1"/>
+          </p:cNvPicPr>
+          <p:nvPr/>
+        </p:nvPicPr>
+        <p:blipFill rotWithShape="1">
+          <a:blip r:embed="rId8">
+            <a:duotone>
+              <a:schemeClr val="accent1">
+                <a:shade val="45000"/>
+                <a:satMod val="135000"/>
+              </a:schemeClr>
+              <a:prstClr val="white"/>
+            </a:duotone>
+            <a:extLst>
+              <a:ext uri="{28A0092B-C50C-407E-A947-70E740481C1C}">
+                <a14:useLocalDpi xmlns:a14="http://schemas.microsoft.com/office/drawing/2010/main" val="0"/>
+              </a:ext>
+              <a:ext uri="{96DAC541-7B7A-43D3-8B79-37D633B846F1}">
+                <asvg:svgBlip xmlns:asvg="http://schemas.microsoft.com/office/drawing/2016/SVG/main" r:embed="rId9"/>
+              </a:ext>
+            </a:extLst>
+          </a:blip>
+          <a:srcRect t="19758" b="39178"/>
+          <a:stretch/>
+        </p:blipFill>
+        <p:spPr>
+          <a:xfrm>
+            <a:off x="4293096" y="2987212"/>
+            <a:ext cx="710946" cy="291944"/>
+          </a:xfrm>
+          <a:prstGeom prst="rect">
+            <a:avLst/>
+          </a:prstGeom>
+        </p:spPr>
+      </p:pic>
+      <p:cxnSp>
+        <p:nvCxnSpPr>
+          <p:cNvPr id="337" name="Straight Arrow Connector 336">
+            <a:extLst>
+              <a:ext uri="{FF2B5EF4-FFF2-40B4-BE49-F238E27FC236}">
+                <a16:creationId xmlns:a16="http://schemas.microsoft.com/office/drawing/2014/main" id="{1985680E-6AB2-BF60-CFEB-6ED7AB3E08BA}"/>
+              </a:ext>
+            </a:extLst>
+          </p:cNvPr>
+          <p:cNvCxnSpPr>
+            <a:cxnSpLocks/>
+          </p:cNvCxnSpPr>
+          <p:nvPr/>
+        </p:nvCxnSpPr>
+        <p:spPr>
+          <a:xfrm flipH="1">
+            <a:off x="4048428" y="2800290"/>
+            <a:ext cx="320174" cy="0"/>
+          </a:xfrm>
+          <a:prstGeom prst="straightConnector1">
+            <a:avLst/>
+          </a:prstGeom>
+          <a:ln w="12700">
+            <a:solidFill>
+              <a:schemeClr val="accent1"/>
+            </a:solidFill>
+            <a:headEnd type="triangle"/>
+            <a:tailEnd type="triangle"/>
+          </a:ln>
+        </p:spPr>
+        <p:style>
+          <a:lnRef idx="1">
+            <a:schemeClr val="accent1"/>
+          </a:lnRef>
+          <a:fillRef idx="0">
+            <a:schemeClr val="accent1"/>
+          </a:fillRef>
+          <a:effectRef idx="0">
+            <a:schemeClr val="accent1"/>
+          </a:effectRef>
+          <a:fontRef idx="minor">
+            <a:schemeClr val="tx1"/>
+          </a:fontRef>
+        </p:style>
+      </p:cxnSp>
+      <p:cxnSp>
+        <p:nvCxnSpPr>
+          <p:cNvPr id="386" name="Connector: Elbow 385">
+            <a:extLst>
+              <a:ext uri="{FF2B5EF4-FFF2-40B4-BE49-F238E27FC236}">
+                <a16:creationId xmlns:a16="http://schemas.microsoft.com/office/drawing/2014/main" id="{B9268D69-00FB-E4C8-1218-14CB2BF516D2}"/>
+              </a:ext>
+            </a:extLst>
+          </p:cNvPr>
+          <p:cNvCxnSpPr>
+            <a:cxnSpLocks/>
+            <a:stCxn id="94" idx="3"/>
+            <a:endCxn id="68" idx="3"/>
+          </p:cNvCxnSpPr>
+          <p:nvPr/>
+        </p:nvCxnSpPr>
+        <p:spPr>
+          <a:xfrm flipV="1">
+            <a:off x="3992590" y="1924012"/>
+            <a:ext cx="100107" cy="1953033"/>
+          </a:xfrm>
+          <a:prstGeom prst="bentConnector3">
+            <a:avLst>
+              <a:gd name="adj1" fmla="val 401429"/>
+            </a:avLst>
+          </a:prstGeom>
+          <a:ln w="12700">
+            <a:headEnd type="triangle" w="med" len="med"/>
+            <a:tailEnd type="triangle" w="med" len="med"/>
+          </a:ln>
+        </p:spPr>
+        <p:style>
+          <a:lnRef idx="1">
+            <a:schemeClr val="accent1"/>
+          </a:lnRef>
+          <a:fillRef idx="0">
+            <a:schemeClr val="accent1"/>
+          </a:fillRef>
+          <a:effectRef idx="0">
+            <a:schemeClr val="accent1"/>
+          </a:effectRef>
+          <a:fontRef idx="minor">
+            <a:schemeClr val="tx1"/>
+          </a:fontRef>
+        </p:style>
+      </p:cxnSp>
+      <p:sp>
+        <p:nvSpPr>
+          <p:cNvPr id="407" name="TextBox 406">
+            <a:extLst>
+              <a:ext uri="{FF2B5EF4-FFF2-40B4-BE49-F238E27FC236}">
+                <a16:creationId xmlns:a16="http://schemas.microsoft.com/office/drawing/2014/main" id="{BE01BD03-1013-EEB8-B968-1DB1110B6135}"/>
+              </a:ext>
+            </a:extLst>
+          </p:cNvPr>
+          <p:cNvSpPr txBox="1"/>
+          <p:nvPr/>
+        </p:nvSpPr>
+        <p:spPr>
+          <a:xfrm>
+            <a:off x="4827855" y="3003282"/>
+            <a:ext cx="862685" cy="317651"/>
+          </a:xfrm>
+          <a:prstGeom prst="rect">
+            <a:avLst/>
+          </a:prstGeom>
+          <a:noFill/>
+        </p:spPr>
+        <p:txBody>
+          <a:bodyPr wrap="square" rtlCol="0">
+            <a:spAutoFit/>
+          </a:bodyPr>
+          <a:lstStyle/>
+          <a:p>
+            <a:pPr algn="ctr">
+              <a:lnSpc>
+                <a:spcPct val="70000"/>
+              </a:lnSpc>
+            </a:pPr>
+            <a:r>
+              <a:rPr lang="fr-CA" sz="1013" dirty="0" err="1"/>
+              <a:t>Competition</a:t>
+            </a:r>
+            <a:br>
+              <a:rPr lang="fr-CA" sz="1013" dirty="0"/>
+            </a:br>
+            <a:r>
+              <a:rPr lang="fr-CA" sz="1013" dirty="0"/>
+              <a:t>Router</a:t>
+            </a:r>
+          </a:p>
+        </p:txBody>
+      </p:sp>
+      <p:sp>
+        <p:nvSpPr>
+          <p:cNvPr id="12" name="TextBox 11">
+            <a:extLst>
+              <a:ext uri="{FF2B5EF4-FFF2-40B4-BE49-F238E27FC236}">
+                <a16:creationId xmlns:a16="http://schemas.microsoft.com/office/drawing/2014/main" id="{BE21DD6A-F02D-D638-943C-F12CEEF526A6}"/>
+              </a:ext>
+            </a:extLst>
+          </p:cNvPr>
+          <p:cNvSpPr txBox="1"/>
+          <p:nvPr/>
+        </p:nvSpPr>
+        <p:spPr>
+          <a:xfrm>
+            <a:off x="3263539" y="1759619"/>
+            <a:ext cx="425116" cy="184089"/>
+          </a:xfrm>
+          <a:prstGeom prst="rect">
+            <a:avLst/>
+          </a:prstGeom>
+          <a:noFill/>
+        </p:spPr>
+        <p:txBody>
+          <a:bodyPr wrap="none" rtlCol="0">
+            <a:spAutoFit/>
+          </a:bodyPr>
+          <a:lstStyle/>
+          <a:p>
+            <a:pPr algn="ctr">
+              <a:lnSpc>
+                <a:spcPct val="70000"/>
+              </a:lnSpc>
+            </a:pPr>
+            <a:r>
+              <a:rPr lang="en-CA" sz="800" dirty="0"/>
+              <a:t>HDMI</a:t>
+            </a:r>
+          </a:p>
+        </p:txBody>
+      </p:sp>
+      <p:sp>
+        <p:nvSpPr>
+          <p:cNvPr id="18" name="TextBox 17">
+            <a:extLst>
+              <a:ext uri="{FF2B5EF4-FFF2-40B4-BE49-F238E27FC236}">
+                <a16:creationId xmlns:a16="http://schemas.microsoft.com/office/drawing/2014/main" id="{E2C70ECE-016A-9A22-AD05-903DFA223D4B}"/>
+              </a:ext>
+            </a:extLst>
+          </p:cNvPr>
+          <p:cNvSpPr txBox="1"/>
+          <p:nvPr/>
+        </p:nvSpPr>
+        <p:spPr>
+          <a:xfrm>
+            <a:off x="3392996" y="3023828"/>
+            <a:ext cx="939371" cy="317651"/>
+          </a:xfrm>
+          <a:prstGeom prst="rect">
+            <a:avLst/>
+          </a:prstGeom>
+          <a:noFill/>
+        </p:spPr>
+        <p:txBody>
+          <a:bodyPr wrap="square" rtlCol="0">
+            <a:spAutoFit/>
+          </a:bodyPr>
+          <a:lstStyle/>
+          <a:p>
+            <a:pPr algn="ctr">
+              <a:lnSpc>
+                <a:spcPct val="70000"/>
+              </a:lnSpc>
+            </a:pPr>
+            <a:r>
+              <a:rPr lang="fr-CA" sz="1013" dirty="0" err="1"/>
+              <a:t>Announcer</a:t>
+            </a:r>
+            <a:br>
+              <a:rPr lang="fr-CA" sz="1013" dirty="0"/>
+            </a:br>
+            <a:r>
+              <a:rPr lang="fr-CA" sz="1013" dirty="0" err="1"/>
+              <a:t>Timekeeper</a:t>
+            </a:r>
+            <a:endParaRPr lang="fr-CA" sz="1013" dirty="0"/>
+          </a:p>
+        </p:txBody>
+      </p:sp>
+      <p:sp>
+        <p:nvSpPr>
+          <p:cNvPr id="79" name="TextBox 78">
+            <a:extLst>
+              <a:ext uri="{FF2B5EF4-FFF2-40B4-BE49-F238E27FC236}">
+                <a16:creationId xmlns:a16="http://schemas.microsoft.com/office/drawing/2014/main" id="{90C8B18D-E554-35ED-B5A1-FB8971D127E8}"/>
+              </a:ext>
+            </a:extLst>
+          </p:cNvPr>
+          <p:cNvSpPr txBox="1"/>
+          <p:nvPr/>
+        </p:nvSpPr>
+        <p:spPr>
+          <a:xfrm>
+            <a:off x="3422911" y="2052591"/>
+            <a:ext cx="939371" cy="317651"/>
+          </a:xfrm>
+          <a:prstGeom prst="rect">
+            <a:avLst/>
+          </a:prstGeom>
+          <a:noFill/>
+        </p:spPr>
+        <p:txBody>
+          <a:bodyPr wrap="square" rtlCol="0">
+            <a:spAutoFit/>
+          </a:bodyPr>
+          <a:lstStyle/>
+          <a:p>
+            <a:pPr algn="ctr">
+              <a:lnSpc>
+                <a:spcPct val="70000"/>
+              </a:lnSpc>
+            </a:pPr>
+            <a:r>
+              <a:rPr lang="fr-CA" sz="1013" dirty="0"/>
+              <a:t>Marshall</a:t>
+            </a:r>
+            <a:br>
+              <a:rPr lang="fr-CA" sz="1013" dirty="0"/>
+            </a:br>
+            <a:r>
+              <a:rPr lang="fr-CA" sz="1013" dirty="0" err="1"/>
+              <a:t>Secretary</a:t>
+            </a:r>
+            <a:endParaRPr lang="fr-CA" sz="1013" dirty="0"/>
+          </a:p>
+        </p:txBody>
+      </p:sp>
+      <p:pic>
+        <p:nvPicPr>
+          <p:cNvPr id="87" name="Graphic 86" descr="Monitor with solid fill">
+            <a:extLst>
+              <a:ext uri="{FF2B5EF4-FFF2-40B4-BE49-F238E27FC236}">
+                <a16:creationId xmlns:a16="http://schemas.microsoft.com/office/drawing/2014/main" id="{6ACA4A9E-0CD9-FF26-669D-2D0AE15C084F}"/>
+              </a:ext>
+            </a:extLst>
+          </p:cNvPr>
+          <p:cNvPicPr>
+            <a:picLocks noChangeAspect="1"/>
+          </p:cNvPicPr>
+          <p:nvPr/>
+        </p:nvPicPr>
+        <p:blipFill>
+          <a:blip r:embed="rId6">
+            <a:extLst>
+              <a:ext uri="{28A0092B-C50C-407E-A947-70E740481C1C}">
+                <a14:useLocalDpi xmlns:a14="http://schemas.microsoft.com/office/drawing/2010/main" val="0"/>
+              </a:ext>
+              <a:ext uri="{96DAC541-7B7A-43D3-8B79-37D633B846F1}">
+                <asvg:svgBlip xmlns:asvg="http://schemas.microsoft.com/office/drawing/2016/SVG/main" r:embed="rId7"/>
+              </a:ext>
+            </a:extLst>
+          </a:blip>
+          <a:stretch>
+            <a:fillRect/>
+          </a:stretch>
+        </p:blipFill>
+        <p:spPr>
+          <a:xfrm>
+            <a:off x="2712187" y="2555776"/>
+            <a:ext cx="463422" cy="463422"/>
+          </a:xfrm>
+          <a:prstGeom prst="rect">
+            <a:avLst/>
+          </a:prstGeom>
+        </p:spPr>
+      </p:pic>
+      <p:sp>
+        <p:nvSpPr>
+          <p:cNvPr id="88" name="TextBox 87">
+            <a:extLst>
+              <a:ext uri="{FF2B5EF4-FFF2-40B4-BE49-F238E27FC236}">
+                <a16:creationId xmlns:a16="http://schemas.microsoft.com/office/drawing/2014/main" id="{5BBB9911-3114-A179-1134-162E24C1AD3A}"/>
+              </a:ext>
+            </a:extLst>
+          </p:cNvPr>
+          <p:cNvSpPr txBox="1"/>
+          <p:nvPr/>
+        </p:nvSpPr>
+        <p:spPr>
+          <a:xfrm>
+            <a:off x="2492896" y="2849072"/>
+            <a:ext cx="939371" cy="426784"/>
+          </a:xfrm>
+          <a:prstGeom prst="rect">
+            <a:avLst/>
+          </a:prstGeom>
+          <a:noFill/>
+        </p:spPr>
+        <p:txBody>
+          <a:bodyPr wrap="square" rtlCol="0">
+            <a:spAutoFit/>
+          </a:bodyPr>
+          <a:lstStyle/>
+          <a:p>
+            <a:pPr algn="ctr">
+              <a:lnSpc>
+                <a:spcPct val="70000"/>
+              </a:lnSpc>
+            </a:pPr>
+            <a:br>
+              <a:rPr lang="fr-CA" sz="1013" dirty="0"/>
+            </a:br>
+            <a:r>
+              <a:rPr lang="fr-CA" sz="1013" dirty="0" err="1"/>
+              <a:t>Attempt</a:t>
+            </a:r>
+            <a:endParaRPr lang="fr-CA" sz="1013" dirty="0"/>
+          </a:p>
+          <a:p>
+            <a:pPr algn="ctr">
+              <a:lnSpc>
+                <a:spcPct val="70000"/>
+              </a:lnSpc>
+            </a:pPr>
+            <a:r>
+              <a:rPr lang="fr-CA" sz="1013" dirty="0" err="1"/>
+              <a:t>Board</a:t>
+            </a:r>
+            <a:endParaRPr lang="fr-CA" sz="1013" dirty="0"/>
+          </a:p>
+        </p:txBody>
+      </p:sp>
+      <p:cxnSp>
+        <p:nvCxnSpPr>
+          <p:cNvPr id="91" name="Straight Arrow Connector 90">
+            <a:extLst>
+              <a:ext uri="{FF2B5EF4-FFF2-40B4-BE49-F238E27FC236}">
+                <a16:creationId xmlns:a16="http://schemas.microsoft.com/office/drawing/2014/main" id="{7B4A887B-52B4-A7A8-4678-09EAEEA5EDCF}"/>
+              </a:ext>
+            </a:extLst>
+          </p:cNvPr>
+          <p:cNvCxnSpPr>
+            <a:endCxn id="87" idx="3"/>
+          </p:cNvCxnSpPr>
+          <p:nvPr/>
+        </p:nvCxnSpPr>
+        <p:spPr>
+          <a:xfrm flipH="1">
+            <a:off x="3175609" y="2783899"/>
+            <a:ext cx="465878" cy="3588"/>
+          </a:xfrm>
+          <a:prstGeom prst="straightConnector1">
+            <a:avLst/>
+          </a:prstGeom>
+          <a:ln w="25400">
+            <a:solidFill>
+              <a:schemeClr val="accent6">
+                <a:lumMod val="75000"/>
+              </a:schemeClr>
+            </a:solidFill>
+            <a:tailEnd type="triangle"/>
+          </a:ln>
+        </p:spPr>
+        <p:style>
+          <a:lnRef idx="1">
+            <a:schemeClr val="accent1"/>
+          </a:lnRef>
+          <a:fillRef idx="0">
+            <a:schemeClr val="accent1"/>
+          </a:fillRef>
+          <a:effectRef idx="0">
+            <a:schemeClr val="accent1"/>
+          </a:effectRef>
+          <a:fontRef idx="minor">
+            <a:schemeClr val="tx1"/>
+          </a:fontRef>
+        </p:style>
+      </p:cxnSp>
+      <p:sp>
+        <p:nvSpPr>
+          <p:cNvPr id="93" name="TextBox 92">
+            <a:extLst>
+              <a:ext uri="{FF2B5EF4-FFF2-40B4-BE49-F238E27FC236}">
+                <a16:creationId xmlns:a16="http://schemas.microsoft.com/office/drawing/2014/main" id="{2F7B7D8D-39F5-1A4D-9DE3-F1C990EBED96}"/>
+              </a:ext>
+            </a:extLst>
+          </p:cNvPr>
+          <p:cNvSpPr txBox="1"/>
+          <p:nvPr/>
+        </p:nvSpPr>
+        <p:spPr>
+          <a:xfrm>
+            <a:off x="3249781" y="2619506"/>
+            <a:ext cx="425116" cy="184089"/>
+          </a:xfrm>
+          <a:prstGeom prst="rect">
+            <a:avLst/>
+          </a:prstGeom>
+          <a:noFill/>
+        </p:spPr>
+        <p:txBody>
+          <a:bodyPr wrap="none" rtlCol="0">
+            <a:spAutoFit/>
+          </a:bodyPr>
+          <a:lstStyle/>
+          <a:p>
+            <a:pPr algn="ctr">
+              <a:lnSpc>
+                <a:spcPct val="70000"/>
+              </a:lnSpc>
+            </a:pPr>
+            <a:r>
+              <a:rPr lang="en-CA" sz="800" dirty="0"/>
+              <a:t>HDMI</a:t>
+            </a:r>
+          </a:p>
+        </p:txBody>
+      </p:sp>
+      <p:pic>
+        <p:nvPicPr>
+          <p:cNvPr id="94" name="Graphic 93" descr="Smart Phone">
+            <a:extLst>
+              <a:ext uri="{FF2B5EF4-FFF2-40B4-BE49-F238E27FC236}">
+                <a16:creationId xmlns:a16="http://schemas.microsoft.com/office/drawing/2014/main" id="{7C77A85E-7AAA-8DAA-EC3F-67A83B132FDE}"/>
+              </a:ext>
+            </a:extLst>
+          </p:cNvPr>
+          <p:cNvPicPr>
+            <a:picLocks noChangeAspect="1"/>
+          </p:cNvPicPr>
+          <p:nvPr/>
+        </p:nvPicPr>
+        <p:blipFill>
+          <a:blip r:embed="rId10">
+            <a:extLst>
+              <a:ext uri="{28A0092B-C50C-407E-A947-70E740481C1C}">
+                <a14:useLocalDpi xmlns:a14="http://schemas.microsoft.com/office/drawing/2010/main" val="0"/>
+              </a:ext>
+              <a:ext uri="{96DAC541-7B7A-43D3-8B79-37D633B846F1}">
+                <asvg:svgBlip xmlns:asvg="http://schemas.microsoft.com/office/drawing/2016/SVG/main" r:embed="rId11"/>
+              </a:ext>
+            </a:extLst>
+          </a:blip>
+          <a:stretch>
+            <a:fillRect/>
+          </a:stretch>
+        </p:blipFill>
+        <p:spPr>
+          <a:xfrm>
+            <a:off x="3735415" y="3748457"/>
+            <a:ext cx="257175" cy="257175"/>
+          </a:xfrm>
+          <a:prstGeom prst="rect">
+            <a:avLst/>
+          </a:prstGeom>
+        </p:spPr>
+      </p:pic>
+      <p:pic>
+        <p:nvPicPr>
+          <p:cNvPr id="98" name="Graphic 97" descr="Smart Phone">
+            <a:extLst>
+              <a:ext uri="{FF2B5EF4-FFF2-40B4-BE49-F238E27FC236}">
+                <a16:creationId xmlns:a16="http://schemas.microsoft.com/office/drawing/2014/main" id="{C185BAE4-F4A2-B662-61BA-B911E5DF12DE}"/>
+              </a:ext>
+            </a:extLst>
+          </p:cNvPr>
+          <p:cNvPicPr>
+            <a:picLocks noChangeAspect="1"/>
+          </p:cNvPicPr>
+          <p:nvPr/>
+        </p:nvPicPr>
+        <p:blipFill>
+          <a:blip r:embed="rId10">
+            <a:extLst>
+              <a:ext uri="{28A0092B-C50C-407E-A947-70E740481C1C}">
+                <a14:useLocalDpi xmlns:a14="http://schemas.microsoft.com/office/drawing/2010/main" val="0"/>
+              </a:ext>
+              <a:ext uri="{96DAC541-7B7A-43D3-8B79-37D633B846F1}">
+                <asvg:svgBlip xmlns:asvg="http://schemas.microsoft.com/office/drawing/2016/SVG/main" r:embed="rId11"/>
+              </a:ext>
+            </a:extLst>
+          </a:blip>
+          <a:stretch>
+            <a:fillRect/>
+          </a:stretch>
+        </p:blipFill>
+        <p:spPr>
+          <a:xfrm>
+            <a:off x="3487671" y="3748142"/>
+            <a:ext cx="257175" cy="257175"/>
+          </a:xfrm>
+          <a:prstGeom prst="rect">
+            <a:avLst/>
+          </a:prstGeom>
+        </p:spPr>
+      </p:pic>
+      <p:pic>
+        <p:nvPicPr>
+          <p:cNvPr id="99" name="Graphic 98" descr="Smart Phone">
+            <a:extLst>
+              <a:ext uri="{FF2B5EF4-FFF2-40B4-BE49-F238E27FC236}">
+                <a16:creationId xmlns:a16="http://schemas.microsoft.com/office/drawing/2014/main" id="{371710D2-DDB3-16DC-BC2D-4ADDACCA58BE}"/>
+              </a:ext>
+            </a:extLst>
+          </p:cNvPr>
+          <p:cNvPicPr>
+            <a:picLocks noChangeAspect="1"/>
+          </p:cNvPicPr>
+          <p:nvPr/>
+        </p:nvPicPr>
+        <p:blipFill>
+          <a:blip r:embed="rId10">
+            <a:extLst>
+              <a:ext uri="{28A0092B-C50C-407E-A947-70E740481C1C}">
+                <a14:useLocalDpi xmlns:a14="http://schemas.microsoft.com/office/drawing/2010/main" val="0"/>
+              </a:ext>
+              <a:ext uri="{96DAC541-7B7A-43D3-8B79-37D633B846F1}">
+                <asvg:svgBlip xmlns:asvg="http://schemas.microsoft.com/office/drawing/2016/SVG/main" r:embed="rId11"/>
+              </a:ext>
+            </a:extLst>
+          </a:blip>
+          <a:stretch>
+            <a:fillRect/>
+          </a:stretch>
+        </p:blipFill>
+        <p:spPr>
+          <a:xfrm>
+            <a:off x="3239927" y="3747827"/>
+            <a:ext cx="257175" cy="257175"/>
+          </a:xfrm>
+          <a:prstGeom prst="rect">
+            <a:avLst/>
+          </a:prstGeom>
+        </p:spPr>
+      </p:pic>
+      <p:pic>
+        <p:nvPicPr>
+          <p:cNvPr id="109" name="Picture 108">
+            <a:extLst>
+              <a:ext uri="{FF2B5EF4-FFF2-40B4-BE49-F238E27FC236}">
+                <a16:creationId xmlns:a16="http://schemas.microsoft.com/office/drawing/2014/main" id="{0FECFE45-D370-6CD6-A81A-3660C17F1505}"/>
+              </a:ext>
+            </a:extLst>
+          </p:cNvPr>
+          <p:cNvPicPr>
+            <a:picLocks noChangeAspect="1"/>
+          </p:cNvPicPr>
+          <p:nvPr/>
+        </p:nvPicPr>
+        <p:blipFill>
+          <a:blip r:embed="rId12">
+            <a:extLst>
+              <a:ext uri="{28A0092B-C50C-407E-A947-70E740481C1C}">
+                <a14:useLocalDpi xmlns:a14="http://schemas.microsoft.com/office/drawing/2010/main" val="0"/>
+              </a:ext>
+              <a:ext uri="{837473B0-CC2E-450A-ABE3-18F120FF3D39}">
+                <a1611:picAttrSrcUrl xmlns:a1611="http://schemas.microsoft.com/office/drawing/2016/11/main" r:id="rId13"/>
+              </a:ext>
+            </a:extLst>
+          </a:blip>
+          <a:stretch>
+            <a:fillRect/>
+          </a:stretch>
+        </p:blipFill>
+        <p:spPr>
+          <a:xfrm>
+            <a:off x="4108515" y="3695051"/>
+            <a:ext cx="182880" cy="134684"/>
+          </a:xfrm>
+          <a:prstGeom prst="rect">
+            <a:avLst/>
+          </a:prstGeom>
+        </p:spPr>
+      </p:pic>
+      <p:sp>
+        <p:nvSpPr>
+          <p:cNvPr id="110" name="TextBox 109">
+            <a:extLst>
+              <a:ext uri="{FF2B5EF4-FFF2-40B4-BE49-F238E27FC236}">
+                <a16:creationId xmlns:a16="http://schemas.microsoft.com/office/drawing/2014/main" id="{8B3F18EF-195C-F030-D7F5-D1C95D7DFBFE}"/>
+              </a:ext>
+            </a:extLst>
+          </p:cNvPr>
+          <p:cNvSpPr txBox="1"/>
+          <p:nvPr/>
+        </p:nvSpPr>
+        <p:spPr>
+          <a:xfrm>
+            <a:off x="2507645" y="3718213"/>
+            <a:ext cx="862685" cy="317651"/>
+          </a:xfrm>
+          <a:prstGeom prst="rect">
+            <a:avLst/>
+          </a:prstGeom>
+          <a:noFill/>
+        </p:spPr>
+        <p:txBody>
+          <a:bodyPr wrap="square" rtlCol="0">
+            <a:spAutoFit/>
+          </a:bodyPr>
+          <a:lstStyle/>
+          <a:p>
+            <a:pPr algn="ctr">
+              <a:lnSpc>
+                <a:spcPct val="70000"/>
+              </a:lnSpc>
+            </a:pPr>
+            <a:r>
+              <a:rPr lang="fr-CA" sz="1013" dirty="0"/>
+              <a:t>Referee</a:t>
+            </a:r>
+            <a:br>
+              <a:rPr lang="fr-CA" sz="1013" dirty="0"/>
+            </a:br>
+            <a:r>
+              <a:rPr lang="fr-CA" sz="1013" dirty="0"/>
+              <a:t>phones</a:t>
+            </a:r>
+          </a:p>
+        </p:txBody>
+      </p:sp>
+    </p:spTree>
+    <p:extLst>
+      <p:ext uri="{BB962C8B-B14F-4D97-AF65-F5344CB8AC3E}">
+        <p14:creationId xmlns:p14="http://schemas.microsoft.com/office/powerpoint/2010/main" val="2910309073"/>
+      </p:ext>
+    </p:extLst>
+  </p:cSld>
+  <p:clrMapOvr>
+    <a:masterClrMapping/>
+  </p:clrMapOvr>
+</p:sld>
+</file>
+
+<file path=ppt/slides/slide2.xml><?xml version="1.0" encoding="utf-8"?>
+<p:sld xmlns:a="http://schemas.openxmlformats.org/drawingml/2006/main" xmlns:r="http://schemas.openxmlformats.org/officeDocument/2006/relationships" xmlns:p="http://schemas.openxmlformats.org/presentationml/2006/main">
+  <p:cSld>
+    <p:spTree>
+      <p:nvGrpSpPr>
+        <p:cNvPr id="1" name=""/>
+        <p:cNvGrpSpPr/>
+        <p:nvPr/>
+      </p:nvGrpSpPr>
+      <p:grpSpPr>
+        <a:xfrm>
+          <a:off x="0" y="0"/>
+          <a:ext cx="0" cy="0"/>
+          <a:chOff x="0" y="0"/>
+          <a:chExt cx="0" cy="0"/>
+        </a:xfrm>
+      </p:grpSpPr>
+      <p:sp>
+        <p:nvSpPr>
+          <p:cNvPr id="72" name="TextBox 71">
+            <a:extLst>
+              <a:ext uri="{FF2B5EF4-FFF2-40B4-BE49-F238E27FC236}">
+                <a16:creationId xmlns:a16="http://schemas.microsoft.com/office/drawing/2014/main" id="{2203EEF7-8763-B761-8E52-FD53115C8BC4}"/>
+              </a:ext>
+            </a:extLst>
+          </p:cNvPr>
+          <p:cNvSpPr txBox="1"/>
+          <p:nvPr/>
+        </p:nvSpPr>
+        <p:spPr>
+          <a:xfrm>
             <a:off x="3568128" y="4026002"/>
             <a:ext cx="587020" cy="248209"/>
           </a:xfrm>
@@ -11626,7 +12668,7 @@
     </p:spTree>
     <p:extLst>
       <p:ext uri="{BB962C8B-B14F-4D97-AF65-F5344CB8AC3E}">
-        <p14:creationId xmlns:p14="http://schemas.microsoft.com/office/powerpoint/2010/main" val="2910309073"/>
+        <p14:creationId xmlns:p14="http://schemas.microsoft.com/office/powerpoint/2010/main" val="2223507633"/>
       </p:ext>
     </p:extLst>
   </p:cSld>
@@ -11636,7 +12678,7 @@
 </p:sld>
 </file>
 
-<file path=ppt/slides/slide2.xml><?xml version="1.0" encoding="utf-8"?>
+<file path=ppt/slides/slide3.xml><?xml version="1.0" encoding="utf-8"?>
 <p:sld xmlns:a="http://schemas.openxmlformats.org/drawingml/2006/main" xmlns:r="http://schemas.openxmlformats.org/officeDocument/2006/relationships" xmlns:p="http://schemas.openxmlformats.org/presentationml/2006/main">
   <p:cSld>
     <p:spTree>
@@ -18560,7 +19602,7 @@
 </p:sld>
 </file>
 
-<file path=ppt/slides/slide3.xml><?xml version="1.0" encoding="utf-8"?>
+<file path=ppt/slides/slide4.xml><?xml version="1.0" encoding="utf-8"?>
 <p:sld xmlns:a="http://schemas.openxmlformats.org/drawingml/2006/main" xmlns:r="http://schemas.openxmlformats.org/officeDocument/2006/relationships" xmlns:p="http://schemas.openxmlformats.org/presentationml/2006/main">
   <p:cSld>
     <p:spTree>
@@ -26435,7 +27477,7 @@
 </p:sld>
 </file>
 
-<file path=ppt/slides/slide4.xml><?xml version="1.0" encoding="utf-8"?>
+<file path=ppt/slides/slide5.xml><?xml version="1.0" encoding="utf-8"?>
 <p:sld xmlns:a="http://schemas.openxmlformats.org/drawingml/2006/main" xmlns:r="http://schemas.openxmlformats.org/officeDocument/2006/relationships" xmlns:p="http://schemas.openxmlformats.org/presentationml/2006/main">
   <p:cSld>
     <p:spTree>
@@ -28253,7 +29295,7 @@
 </p:sld>
 </file>
 
-<file path=ppt/slides/slide5.xml><?xml version="1.0" encoding="utf-8"?>
+<file path=ppt/slides/slide6.xml><?xml version="1.0" encoding="utf-8"?>
 <p:sld xmlns:a="http://schemas.openxmlformats.org/drawingml/2006/main" xmlns:r="http://schemas.openxmlformats.org/officeDocument/2006/relationships" xmlns:p="http://schemas.openxmlformats.org/presentationml/2006/main">
   <p:cSld>
     <p:spTree>

</xml_diff>